<commit_message>
Add pdf version of poster
</commit_message>
<xml_diff>
--- a/latex/poster.pptx
+++ b/latex/poster.pptx
@@ -125,40 +125,6 @@
     </p:extLst>
   </p:cmAuthor>
 </p:cmAuthorLst>
-</file>
-
-<file path=ppt/comments/comment1.xml><?xml version="1.0" encoding="utf-8"?>
-<p:cmLst xmlns:a="http://schemas.openxmlformats.org/drawingml/2006/main" xmlns:r="http://schemas.openxmlformats.org/officeDocument/2006/relationships" xmlns:p="http://schemas.openxmlformats.org/presentationml/2006/main">
-  <p:cm authorId="1" dt="2015-12-02T00:05:52.528" idx="1">
-    <p:pos x="22354" y="5314"/>
-    <p:text>need to add correct graphs and probably add labels on the side?</p:text>
-    <p:extLst>
-      <p:ext uri="{C676402C-5697-4E1C-873F-D02D1690AC5C}">
-        <p15:threadingInfo xmlns:p15="http://schemas.microsoft.com/office/powerpoint/2012/main" timeZoneBias="300"/>
-      </p:ext>
-    </p:extLst>
-  </p:cm>
-  <p:cm authorId="1" dt="2015-12-02T00:22:32.494" idx="2">
-    <p:pos x="5907" y="10946"/>
-    <p:text>make sure labels are correct?</p:text>
-    <p:extLst mod="1">
-      <p:ext uri="{C676402C-5697-4E1C-873F-D02D1690AC5C}">
-        <p15:threadingInfo xmlns:p15="http://schemas.microsoft.com/office/powerpoint/2012/main" timeZoneBias="300"/>
-      </p:ext>
-    </p:extLst>
-  </p:cm>
-  <p:cm authorId="1" dt="2015-12-02T16:06:17.040" idx="3">
-    <p:pos x="5907" y="11042"/>
-    <p:text>is this formatting / use of space awkward?</p:text>
-    <p:extLst>
-      <p:ext uri="{C676402C-5697-4E1C-873F-D02D1690AC5C}">
-        <p15:threadingInfo xmlns:p15="http://schemas.microsoft.com/office/powerpoint/2012/main" timeZoneBias="300">
-          <p15:parentCm authorId="1" idx="2"/>
-        </p15:threadingInfo>
-      </p:ext>
-    </p:extLst>
-  </p:cm>
-</p:cmLst>
 </file>
 
 <file path=ppt/notesMasters/notesMaster1.xml><?xml version="1.0" encoding="utf-8"?>
@@ -3462,36 +3428,6 @@
           <a:chExt cx="0" cy="0"/>
         </a:xfrm>
       </p:grpSpPr>
-      <p:pic>
-        <p:nvPicPr>
-          <p:cNvPr id="39" name="Picture 38"/>
-          <p:cNvPicPr>
-            <a:picLocks noChangeAspect="1"/>
-          </p:cNvPicPr>
-          <p:nvPr/>
-        </p:nvPicPr>
-        <p:blipFill>
-          <a:blip r:embed="rId3">
-            <a:extLst>
-              <a:ext uri="{28A0092B-C50C-407E-A947-70E740481C1C}">
-                <a14:useLocalDpi xmlns:a14="http://schemas.microsoft.com/office/drawing/2010/main" val="0"/>
-              </a:ext>
-            </a:extLst>
-          </a:blip>
-          <a:stretch>
-            <a:fillRect/>
-          </a:stretch>
-        </p:blipFill>
-        <p:spPr>
-          <a:xfrm>
-            <a:off x="7903798" y="22642245"/>
-            <a:ext cx="6074997" cy="4176560"/>
-          </a:xfrm>
-          <a:prstGeom prst="rect">
-            <a:avLst/>
-          </a:prstGeom>
-        </p:spPr>
-      </p:pic>
       <p:sp>
         <p:nvSpPr>
           <p:cNvPr id="13" name="Rectangle 12"/>
@@ -3564,15 +3500,7 @@
                   <a:srgbClr val="F9F1EC"/>
                 </a:solidFill>
               </a:rPr>
-              <a:t>Gaussian Process for Crime </a:t>
-            </a:r>
-            <a:r>
-              <a:rPr lang="en-US" sz="10000" b="1" dirty="0" smtClean="0">
-                <a:solidFill>
-                  <a:srgbClr val="F9F1EC"/>
-                </a:solidFill>
-              </a:rPr>
-              <a:t>Prediction</a:t>
+              <a:t>Gaussian Process for Crime Prediction</a:t>
             </a:r>
           </a:p>
           <a:p>
@@ -3604,66 +3532,6 @@
           </a:p>
         </p:txBody>
       </p:sp>
-      <p:pic>
-        <p:nvPicPr>
-          <p:cNvPr id="7" name="Picture 6"/>
-          <p:cNvPicPr>
-            <a:picLocks noChangeAspect="1"/>
-          </p:cNvPicPr>
-          <p:nvPr/>
-        </p:nvPicPr>
-        <p:blipFill>
-          <a:blip r:embed="rId4">
-            <a:extLst>
-              <a:ext uri="{28A0092B-C50C-407E-A947-70E740481C1C}">
-                <a14:useLocalDpi xmlns:a14="http://schemas.microsoft.com/office/drawing/2010/main" val="0"/>
-              </a:ext>
-            </a:extLst>
-          </a:blip>
-          <a:stretch>
-            <a:fillRect/>
-          </a:stretch>
-        </p:blipFill>
-        <p:spPr>
-          <a:xfrm>
-            <a:off x="36866671" y="20986670"/>
-            <a:ext cx="6074992" cy="4176556"/>
-          </a:xfrm>
-          <a:prstGeom prst="rect">
-            <a:avLst/>
-          </a:prstGeom>
-        </p:spPr>
-      </p:pic>
-      <p:pic>
-        <p:nvPicPr>
-          <p:cNvPr id="8" name="Picture 7"/>
-          <p:cNvPicPr>
-            <a:picLocks noChangeAspect="1"/>
-          </p:cNvPicPr>
-          <p:nvPr/>
-        </p:nvPicPr>
-        <p:blipFill>
-          <a:blip r:embed="rId5">
-            <a:extLst>
-              <a:ext uri="{28A0092B-C50C-407E-A947-70E740481C1C}">
-                <a14:useLocalDpi xmlns:a14="http://schemas.microsoft.com/office/drawing/2010/main" val="0"/>
-              </a:ext>
-            </a:extLst>
-          </a:blip>
-          <a:stretch>
-            <a:fillRect/>
-          </a:stretch>
-        </p:blipFill>
-        <p:spPr>
-          <a:xfrm>
-            <a:off x="36866671" y="15955729"/>
-            <a:ext cx="6074992" cy="4176557"/>
-          </a:xfrm>
-          <a:prstGeom prst="rect">
-            <a:avLst/>
-          </a:prstGeom>
-        </p:spPr>
-      </p:pic>
       <p:sp>
         <p:nvSpPr>
           <p:cNvPr id="21" name="TextBox 20"/>
@@ -3978,8 +3846,8 @@
           </a:p>
         </p:txBody>
       </p:sp>
-      <mc:AlternateContent xmlns:mc="http://schemas.openxmlformats.org/markup-compatibility/2006">
-        <mc:Choice xmlns:a14="http://schemas.microsoft.com/office/drawing/2010/main" Requires="a14">
+      <mc:AlternateContent xmlns:mc="http://schemas.openxmlformats.org/markup-compatibility/2006" xmlns:a14="http://schemas.microsoft.com/office/drawing/2010/main">
+        <mc:Choice Requires="a14">
           <p:sp>
             <p:nvSpPr>
               <p:cNvPr id="32" name="TextBox 31"/>
@@ -4004,19 +3872,7 @@
               <a:p>
                 <a:r>
                   <a:rPr lang="en-US" sz="3200" dirty="0" smtClean="0"/>
-                  <a:t>For data we use </a:t>
-                </a:r>
-                <a:r>
-                  <a:rPr lang="en-US" sz="3200" dirty="0" smtClean="0"/>
-                  <a:t>public datasets </a:t>
-                </a:r>
-                <a:r>
-                  <a:rPr lang="en-US" sz="3200" dirty="0" smtClean="0"/>
-                  <a:t>on historical criminal activity from Boston and San Francisco. </a:t>
-                </a:r>
-                <a:r>
-                  <a:rPr lang="en-US" sz="3200" dirty="0" smtClean="0"/>
-                  <a:t>We process the data by extracting three features: months since first record, latitude, and longitude. Then we divide the city into N buckets per latitude and longitude, for a total of N^2 buckets and count the number of crime incidents per square. In order to ensure positive predictions, we take the log of the count, adding eps for stability.</a:t>
+                  <a:t>For data we use public datasets on historical criminal activity from Boston and San Francisco. We process the data by extracting three features: months since first record, latitude, and longitude. Then we divide the city into N buckets per latitude and longitude, for a total of N^2 buckets and count the number of crime incidents per square. In order to ensure positive predictions, we take the log of the count, adding eps for stability.</a:t>
                 </a:r>
               </a:p>
               <a:p>
@@ -4029,6 +3885,7 @@
                 </a:r>
               </a:p>
               <a:p>
+                <a:pPr/>
                 <a14:m>
                   <m:oMathPara xmlns:m="http://schemas.openxmlformats.org/officeDocument/2006/math">
                     <m:oMathParaPr>
@@ -4582,7 +4439,7 @@
             </p:txBody>
           </p:sp>
         </mc:Choice>
-        <mc:Fallback>
+        <mc:Fallback xmlns="">
           <p:sp>
             <p:nvSpPr>
               <p:cNvPr id="32" name="TextBox 31"/>
@@ -4623,36 +4480,6 @@
       </mc:AlternateContent>
       <p:pic>
         <p:nvPicPr>
-          <p:cNvPr id="35" name="Picture 34"/>
-          <p:cNvPicPr>
-            <a:picLocks noChangeAspect="1"/>
-          </p:cNvPicPr>
-          <p:nvPr/>
-        </p:nvPicPr>
-        <p:blipFill>
-          <a:blip r:embed="rId5">
-            <a:extLst>
-              <a:ext uri="{28A0092B-C50C-407E-A947-70E740481C1C}">
-                <a14:useLocalDpi xmlns:a14="http://schemas.microsoft.com/office/drawing/2010/main" val="0"/>
-              </a:ext>
-            </a:extLst>
-          </a:blip>
-          <a:stretch>
-            <a:fillRect/>
-          </a:stretch>
-        </p:blipFill>
-        <p:spPr>
-          <a:xfrm>
-            <a:off x="36866671" y="10924788"/>
-            <a:ext cx="6074992" cy="4176557"/>
-          </a:xfrm>
-          <a:prstGeom prst="rect">
-            <a:avLst/>
-          </a:prstGeom>
-        </p:spPr>
-      </p:pic>
-      <p:pic>
-        <p:nvPicPr>
           <p:cNvPr id="36" name="Picture 35"/>
           <p:cNvPicPr>
             <a:picLocks noChangeAspect="1"/>
@@ -4708,11 +4535,7 @@
             </a:pPr>
             <a:r>
               <a:rPr lang="en-US" sz="3200" dirty="0" smtClean="0"/>
-              <a:t>Explore kernels more suited to the problem domain, specifically periodic kernels that capture the cyclic nature of crime and its </a:t>
-            </a:r>
-            <a:r>
-              <a:rPr lang="en-US" sz="3200" dirty="0" smtClean="0"/>
-              <a:t>variants when combined with linear and squared exponential kernels:</a:t>
+              <a:t>Explore kernels more suited to the problem domain, specifically periodic kernels that capture the cyclic nature of crime and its variants when combined with linear and squared exponential kernels:</a:t>
             </a:r>
           </a:p>
           <a:p>
@@ -4728,11 +4551,7 @@
             </a:r>
             <a:r>
               <a:rPr lang="en-US" sz="3200" dirty="0" smtClean="0"/>
-              <a:t>           </a:t>
-            </a:r>
-            <a:r>
-              <a:rPr lang="en-US" sz="3200" dirty="0" smtClean="0"/>
-              <a:t>can vary over time</a:t>
+              <a:t>           can vary over time</a:t>
             </a:r>
           </a:p>
           <a:p>
@@ -4764,7 +4583,6 @@
               <a:rPr lang="en-US" sz="3200" dirty="0" smtClean="0"/>
               <a:t>         - Linear + periodic: periodic function with increasing mean</a:t>
             </a:r>
-            <a:endParaRPr lang="en-US" sz="3200" dirty="0" smtClean="0"/>
           </a:p>
           <a:p>
             <a:pPr marL="457200" indent="-457200">
@@ -4773,15 +4591,7 @@
             </a:pPr>
             <a:r>
               <a:rPr lang="en-US" sz="3200" dirty="0" smtClean="0"/>
-              <a:t>Acquire access to greater computational resources or explore less </a:t>
-            </a:r>
-            <a:r>
-              <a:rPr lang="en-US" sz="3200" dirty="0" smtClean="0"/>
-              <a:t>costly regression in order </a:t>
-            </a:r>
-            <a:r>
-              <a:rPr lang="en-US" sz="3200" dirty="0" smtClean="0"/>
-              <a:t>to explore larger datasets (e.g. Chicago), greater buckets per dimension (i.e. larger N), and/or finer temporal discretization</a:t>
+              <a:t>Acquire access to greater computational resources or explore less costly regression in order to explore larger datasets (e.g. Chicago), greater buckets per dimension (i.e. larger N), and/or finer temporal discretization</a:t>
             </a:r>
           </a:p>
           <a:p>
@@ -4793,7 +4603,6 @@
               <a:rPr lang="en-US" sz="3200" dirty="0" smtClean="0"/>
               <a:t>Determine a realistic noise parameter and explore its effects on the regression</a:t>
             </a:r>
-            <a:endParaRPr lang="en-US" sz="3200" dirty="0" smtClean="0"/>
           </a:p>
         </p:txBody>
       </p:sp>
@@ -4928,8 +4737,8 @@
         </p:nvSpPr>
         <p:spPr>
           <a:xfrm>
-            <a:off x="2515399" y="23938687"/>
-            <a:ext cx="4696718" cy="954107"/>
+            <a:off x="2515399" y="24152952"/>
+            <a:ext cx="4696718" cy="1384995"/>
           </a:xfrm>
           <a:prstGeom prst="rect">
             <a:avLst/>
@@ -4958,7 +4767,7 @@
                   <a:srgbClr val="2D1E3E"/>
                 </a:solidFill>
               </a:rPr>
-              <a:t>Model likelihood vs grid size for </a:t>
+              <a:t>Predictive distribution vs true distribution for some geographical buckets </a:t>
             </a:r>
             <a:r>
               <a:rPr lang="en-US" sz="2800" dirty="0" smtClean="0">
@@ -4966,9 +4775,13 @@
                   <a:srgbClr val="2D1E3E"/>
                 </a:solidFill>
               </a:rPr>
-              <a:t>San Francisco</a:t>
-            </a:r>
-            <a:endParaRPr lang="en-US" sz="2800" dirty="0"/>
+              <a:t>in SF</a:t>
+            </a:r>
+            <a:endParaRPr lang="en-US" sz="2800" dirty="0">
+              <a:solidFill>
+                <a:srgbClr val="2D1E3E"/>
+              </a:solidFill>
+            </a:endParaRPr>
           </a:p>
         </p:txBody>
       </p:sp>
@@ -5002,15 +4815,7 @@
                   <a:srgbClr val="2D1E3E"/>
                 </a:solidFill>
               </a:rPr>
-              <a:t>Above: </a:t>
-            </a:r>
-            <a:r>
-              <a:rPr lang="en-US" sz="2800" dirty="0" smtClean="0">
-                <a:solidFill>
-                  <a:srgbClr val="2D1E3E"/>
-                </a:solidFill>
-              </a:rPr>
-              <a:t>geographic </a:t>
+              <a:t>Above: geographic </a:t>
             </a:r>
             <a:r>
               <a:rPr lang="en-US" sz="2800" dirty="0" err="1" smtClean="0">
@@ -5026,7 +4831,7 @@
                   <a:srgbClr val="2D1E3E"/>
                 </a:solidFill>
               </a:rPr>
-              <a:t> </a:t>
+              <a:t> of crime incidence for Boston (left) and San Francisco (right) for t =35, </a:t>
             </a:r>
             <a:r>
               <a:rPr lang="en-US" sz="2800" dirty="0" smtClean="0">
@@ -5034,7 +4839,7 @@
                   <a:srgbClr val="2D1E3E"/>
                 </a:solidFill>
               </a:rPr>
-              <a:t>of crime incidence for Boston (left) and San Francisco (right) </a:t>
+              <a:t>153 </a:t>
             </a:r>
             <a:r>
               <a:rPr lang="en-US" sz="2800" dirty="0" smtClean="0">
@@ -5042,7 +4847,7 @@
                   <a:srgbClr val="2D1E3E"/>
                 </a:solidFill>
               </a:rPr>
-              <a:t>for t =35, 145 months, n=15, X respectively, as </a:t>
+              <a:t>months, n=15, </a:t>
             </a:r>
             <a:r>
               <a:rPr lang="en-US" sz="2800" dirty="0" smtClean="0">
@@ -5050,7 +4855,15 @@
                   <a:srgbClr val="2D1E3E"/>
                 </a:solidFill>
               </a:rPr>
-              <a:t>predicted by a Gaussian process with squared exponential kernel (top), average over months (middle), and true (bottom)</a:t>
+              <a:t>5 </a:t>
+            </a:r>
+            <a:r>
+              <a:rPr lang="en-US" sz="2800" dirty="0" smtClean="0">
+                <a:solidFill>
+                  <a:srgbClr val="2D1E3E"/>
+                </a:solidFill>
+              </a:rPr>
+              <a:t>respectively, as predicted by a Gaussian process with squared exponential kernel (top), average over months (middle), and true (bottom)</a:t>
             </a:r>
             <a:endParaRPr lang="en-US" sz="2800" dirty="0">
               <a:solidFill>
@@ -5314,7 +5127,7 @@
         </p:nvSpPr>
         <p:spPr>
           <a:xfrm>
-            <a:off x="8438428" y="18946623"/>
+            <a:off x="8611936" y="18946623"/>
             <a:ext cx="4696718" cy="954107"/>
           </a:xfrm>
           <a:prstGeom prst="rect">
@@ -5351,7 +5164,7 @@
           <p:nvPr/>
         </p:nvPicPr>
         <p:blipFill>
-          <a:blip r:embed="rId3">
+          <a:blip r:embed="rId10">
             <a:extLst>
               <a:ext uri="{28A0092B-C50C-407E-A947-70E740481C1C}">
                 <a14:useLocalDpi xmlns:a14="http://schemas.microsoft.com/office/drawing/2010/main" val="0"/>
@@ -5380,7 +5193,7 @@
         </p:nvSpPr>
         <p:spPr>
           <a:xfrm>
-            <a:off x="8592937" y="29560320"/>
+            <a:off x="8547791" y="29560320"/>
             <a:ext cx="4696718" cy="1384995"/>
           </a:xfrm>
           <a:prstGeom prst="rect">
@@ -5428,6 +5241,156 @@
           </a:p>
         </p:txBody>
       </p:sp>
+      <p:pic>
+        <p:nvPicPr>
+          <p:cNvPr id="2" name="Picture 1"/>
+          <p:cNvPicPr>
+            <a:picLocks noChangeAspect="1"/>
+          </p:cNvPicPr>
+          <p:nvPr/>
+        </p:nvPicPr>
+        <p:blipFill>
+          <a:blip r:embed="rId11">
+            <a:extLst>
+              <a:ext uri="{28A0092B-C50C-407E-A947-70E740481C1C}">
+                <a14:useLocalDpi xmlns:a14="http://schemas.microsoft.com/office/drawing/2010/main" val="0"/>
+              </a:ext>
+            </a:extLst>
+          </a:blip>
+          <a:stretch>
+            <a:fillRect/>
+          </a:stretch>
+        </p:blipFill>
+        <p:spPr>
+          <a:xfrm>
+            <a:off x="29117759" y="15933094"/>
+            <a:ext cx="6140835" cy="4221824"/>
+          </a:xfrm>
+          <a:prstGeom prst="rect">
+            <a:avLst/>
+          </a:prstGeom>
+        </p:spPr>
+      </p:pic>
+      <p:pic>
+        <p:nvPicPr>
+          <p:cNvPr id="9" name="Picture 8"/>
+          <p:cNvPicPr>
+            <a:picLocks noChangeAspect="1"/>
+          </p:cNvPicPr>
+          <p:nvPr/>
+        </p:nvPicPr>
+        <p:blipFill>
+          <a:blip r:embed="rId12">
+            <a:extLst>
+              <a:ext uri="{28A0092B-C50C-407E-A947-70E740481C1C}">
+                <a14:useLocalDpi xmlns:a14="http://schemas.microsoft.com/office/drawing/2010/main" val="0"/>
+              </a:ext>
+            </a:extLst>
+          </a:blip>
+          <a:stretch>
+            <a:fillRect/>
+          </a:stretch>
+        </p:blipFill>
+        <p:spPr>
+          <a:xfrm>
+            <a:off x="36866672" y="10926519"/>
+            <a:ext cx="6072472" cy="4174824"/>
+          </a:xfrm>
+          <a:prstGeom prst="rect">
+            <a:avLst/>
+          </a:prstGeom>
+        </p:spPr>
+      </p:pic>
+      <p:pic>
+        <p:nvPicPr>
+          <p:cNvPr id="12" name="Picture 11"/>
+          <p:cNvPicPr>
+            <a:picLocks noChangeAspect="1"/>
+          </p:cNvPicPr>
+          <p:nvPr/>
+        </p:nvPicPr>
+        <p:blipFill>
+          <a:blip r:embed="rId13">
+            <a:extLst>
+              <a:ext uri="{28A0092B-C50C-407E-A947-70E740481C1C}">
+                <a14:useLocalDpi xmlns:a14="http://schemas.microsoft.com/office/drawing/2010/main" val="0"/>
+              </a:ext>
+            </a:extLst>
+          </a:blip>
+          <a:stretch>
+            <a:fillRect/>
+          </a:stretch>
+        </p:blipFill>
+        <p:spPr>
+          <a:xfrm>
+            <a:off x="36866671" y="15957459"/>
+            <a:ext cx="6105395" cy="4197459"/>
+          </a:xfrm>
+          <a:prstGeom prst="rect">
+            <a:avLst/>
+          </a:prstGeom>
+        </p:spPr>
+      </p:pic>
+      <p:pic>
+        <p:nvPicPr>
+          <p:cNvPr id="14" name="Picture 13"/>
+          <p:cNvPicPr>
+            <a:picLocks noChangeAspect="1"/>
+          </p:cNvPicPr>
+          <p:nvPr/>
+        </p:nvPicPr>
+        <p:blipFill>
+          <a:blip r:embed="rId14">
+            <a:extLst>
+              <a:ext uri="{28A0092B-C50C-407E-A947-70E740481C1C}">
+                <a14:useLocalDpi xmlns:a14="http://schemas.microsoft.com/office/drawing/2010/main" val="0"/>
+              </a:ext>
+            </a:extLst>
+          </a:blip>
+          <a:stretch>
+            <a:fillRect/>
+          </a:stretch>
+        </p:blipFill>
+        <p:spPr>
+          <a:xfrm>
+            <a:off x="36866671" y="20941801"/>
+            <a:ext cx="6072473" cy="4174825"/>
+          </a:xfrm>
+          <a:prstGeom prst="rect">
+            <a:avLst/>
+          </a:prstGeom>
+        </p:spPr>
+      </p:pic>
+      <p:pic>
+        <p:nvPicPr>
+          <p:cNvPr id="15" name="Picture 14"/>
+          <p:cNvPicPr>
+            <a:picLocks noChangeAspect="1"/>
+          </p:cNvPicPr>
+          <p:nvPr/>
+        </p:nvPicPr>
+        <p:blipFill>
+          <a:blip r:embed="rId15">
+            <a:extLst>
+              <a:ext uri="{28A0092B-C50C-407E-A947-70E740481C1C}">
+                <a14:useLocalDpi xmlns:a14="http://schemas.microsoft.com/office/drawing/2010/main" val="0"/>
+              </a:ext>
+            </a:extLst>
+          </a:blip>
+          <a:stretch>
+            <a:fillRect/>
+          </a:stretch>
+        </p:blipFill>
+        <p:spPr>
+          <a:xfrm>
+            <a:off x="7901257" y="22671536"/>
+            <a:ext cx="5989787" cy="4117978"/>
+          </a:xfrm>
+          <a:prstGeom prst="rect">
+            <a:avLst/>
+          </a:prstGeom>
+        </p:spPr>
+      </p:pic>
     </p:spTree>
     <p:extLst>
       <p:ext uri="{BB962C8B-B14F-4D97-AF65-F5344CB8AC3E}">

</xml_diff>